<commit_message>
swapped description of scatterplot panels to focus on abs then rel, rather than calv then phot
</commit_message>
<xml_diff>
--- a/docs/manuscripts/euc manuscript/figs/euc_MS_figure_panels_JL_10-07-17.pptx
+++ b/docs/manuscripts/euc manuscript/figs/euc_MS_figure_panels_JL_10-07-17.pptx
@@ -5,13 +5,14 @@
     <p:sldMasterId id="2147483696" r:id="rId1"/>
   </p:sldMasterIdLst>
   <p:notesMasterIdLst>
-    <p:notesMasterId r:id="rId6"/>
+    <p:notesMasterId r:id="rId7"/>
   </p:notesMasterIdLst>
   <p:sldIdLst>
     <p:sldId id="289" r:id="rId2"/>
     <p:sldId id="281" r:id="rId3"/>
     <p:sldId id="288" r:id="rId4"/>
-    <p:sldId id="290" r:id="rId5"/>
+    <p:sldId id="291" r:id="rId5"/>
+    <p:sldId id="290" r:id="rId6"/>
   </p:sldIdLst>
   <p:sldSz cx="9601200" cy="12801600" type="A3"/>
   <p:notesSz cx="6858000" cy="9144000"/>
@@ -204,7 +205,7 @@
           <a:p>
             <a:fld id="{36C24D47-6580-4785-9462-CADD8599AFB8}" type="datetimeFigureOut">
               <a:rPr lang="en-AU" smtClean="0"/>
-              <a:t>11/07/2017</a:t>
+              <a:t>13/07/2017</a:t>
             </a:fld>
             <a:endParaRPr lang="en-AU"/>
           </a:p>
@@ -770,11 +771,7 @@
             </a:r>
             <a:r>
               <a:rPr lang="en-AU" u="none" strike="noStrike" dirty="0" smtClean="0"/>
-              <a:t>The steep initial slope of this curve contrasts with those associated with less specialised cells (e.g. mammalian cell, yeast</a:t>
-            </a:r>
-            <a:r>
-              <a:rPr lang="en-AU" u="none" strike="noStrike" dirty="0" smtClean="0"/>
-              <a:t>).</a:t>
+              <a:t>The steep initial slope of this curve contrasts with those associated with less specialised cells (e.g. mammalian cell, yeast).</a:t>
             </a:r>
           </a:p>
           <a:p>
@@ -931,19 +928,7 @@
                 <a:ea typeface="+mn-ea"/>
                 <a:cs typeface="+mn-cs"/>
               </a:rPr>
-              <a:t>3</a:t>
-            </a:r>
-            <a:r>
-              <a:rPr lang="en-AU" sz="1680" b="1" kern="1200" dirty="0" smtClean="0">
-                <a:solidFill>
-                  <a:schemeClr val="tx1"/>
-                </a:solidFill>
-                <a:effectLst/>
-                <a:latin typeface="+mn-lt"/>
-                <a:ea typeface="+mn-ea"/>
-                <a:cs typeface="+mn-cs"/>
-              </a:rPr>
-              <a:t>.) Linking leaf protein abundances with environment and functional traits. </a:t>
+              <a:t>3.) Linking leaf protein abundances with environment and functional traits. </a:t>
             </a:r>
           </a:p>
           <a:p>
@@ -1322,19 +1307,7 @@
                 <a:ea typeface="+mn-ea"/>
                 <a:cs typeface="+mn-cs"/>
               </a:rPr>
-              <a:t>d.) Multiple regression models visualised using coloration to indicate the modelled magnitude of protein abundance in two-dimensional environmental space. Curved contours indicate significant interaction effects between predictors. A full table of multiple regression statistics is presented in the supplementary materials</a:t>
-            </a:r>
-            <a:r>
-              <a:rPr lang="en-AU" sz="1680" kern="1200" dirty="0" smtClean="0">
-                <a:solidFill>
-                  <a:schemeClr val="tx1"/>
-                </a:solidFill>
-                <a:effectLst/>
-                <a:latin typeface="+mn-lt"/>
-                <a:ea typeface="+mn-ea"/>
-                <a:cs typeface="+mn-cs"/>
-              </a:rPr>
-              <a:t>.</a:t>
+              <a:t>d.) Multiple regression models visualised using coloration to indicate the modelled magnitude of protein abundance in two-dimensional environmental space. Curved contours indicate significant interaction effects between predictors. A full table of multiple regression statistics is presented in the supplementary materials.</a:t>
             </a:r>
           </a:p>
           <a:p>
@@ -1460,19 +1433,7 @@
                 <a:ea typeface="+mn-ea"/>
                 <a:cs typeface="+mn-cs"/>
               </a:rPr>
-              <a:t>3</a:t>
-            </a:r>
-            <a:r>
-              <a:rPr lang="en-AU" sz="1680" b="1" kern="1200" dirty="0" smtClean="0">
-                <a:solidFill>
-                  <a:schemeClr val="tx1"/>
-                </a:solidFill>
-                <a:effectLst/>
-                <a:latin typeface="+mn-lt"/>
-                <a:ea typeface="+mn-ea"/>
-                <a:cs typeface="+mn-cs"/>
-              </a:rPr>
-              <a:t>.) Linking leaf protein abundances with environment and functional traits. </a:t>
+              <a:t>3.) Linking leaf protein abundances with environment and functional traits. </a:t>
             </a:r>
           </a:p>
           <a:p>
@@ -1497,19 +1458,7 @@
                 <a:ea typeface="+mn-ea"/>
                 <a:cs typeface="+mn-cs"/>
               </a:rPr>
-              <a:t>a.) We are able to assess wide-area environmental patterns of leaf proteins with specific function, at any level of protein organisation. </a:t>
-            </a:r>
-            <a:r>
-              <a:rPr lang="en-AU" sz="1680" kern="1200" dirty="0" smtClean="0">
-                <a:solidFill>
-                  <a:schemeClr val="tx1"/>
-                </a:solidFill>
-                <a:effectLst/>
-                <a:latin typeface="+mn-lt"/>
-                <a:ea typeface="+mn-ea"/>
-                <a:cs typeface="+mn-cs"/>
-              </a:rPr>
-              <a:t>Here we show a </a:t>
+              <a:t>a.) We are able to assess wide-area environmental patterns of leaf proteins with specific function, at any level of protein organisation. Here we show a </a:t>
             </a:r>
             <a:r>
               <a:rPr lang="en-AU" sz="1680" kern="1200" dirty="0" err="1" smtClean="0">
@@ -1533,8 +1482,21 @@
                 <a:ea typeface="+mn-ea"/>
                 <a:cs typeface="+mn-cs"/>
               </a:rPr>
-              <a:t> of correlations </a:t>
-            </a:r>
+              <a:t> of correlations between environmental variables, functional traits, gas exchange measurements and major protein functional categories. Pearson correlations between pairs of variables are represented by coloured tiles where p &lt; 0.05. Protein abundances on a per leaf area basis (mg protein / m2 leaf area) are used to calculate correlations presented in the bottom/right diagonal and proportional protein abundances (i.e. fraction of total leaf protein abundance) are used to calculate correlations presented in the top/left diagonal.</a:t>
+            </a:r>
+          </a:p>
+          <a:p>
+            <a:endParaRPr lang="en-AU" sz="1680" kern="1200" dirty="0" smtClean="0">
+              <a:solidFill>
+                <a:schemeClr val="tx1"/>
+              </a:solidFill>
+              <a:effectLst/>
+              <a:latin typeface="+mn-lt"/>
+              <a:ea typeface="+mn-ea"/>
+              <a:cs typeface="+mn-cs"/>
+            </a:endParaRPr>
+          </a:p>
+          <a:p>
             <a:r>
               <a:rPr lang="en-AU" sz="1680" kern="1200" dirty="0" smtClean="0">
                 <a:solidFill>
@@ -1545,7 +1507,19 @@
                 <a:ea typeface="+mn-ea"/>
                 <a:cs typeface="+mn-cs"/>
               </a:rPr>
-              <a:t>between environmental variables, functional traits, gas exchange measurements and major protein functional categories. Pearson correlations between pairs of </a:t>
+              <a:t>b.) We selected several relationships for deeper analysis which are of current interest to the vegetation modelling community, but which to date have only been investigated via proxies. Trends in abundance of photosystem proteins [symbol, colour] and Calvin cycle enzymes [symbol, colour] are shown across gradients of: </a:t>
+            </a:r>
+            <a:r>
+              <a:rPr lang="en-AU" sz="1680" kern="1200" dirty="0" err="1" smtClean="0">
+                <a:solidFill>
+                  <a:schemeClr val="tx1"/>
+                </a:solidFill>
+                <a:effectLst/>
+                <a:latin typeface="+mn-lt"/>
+                <a:ea typeface="+mn-ea"/>
+                <a:cs typeface="+mn-cs"/>
+              </a:rPr>
+              <a:t>i,ii</a:t>
             </a:r>
             <a:r>
               <a:rPr lang="en-AU" sz="1680" kern="1200" dirty="0" smtClean="0">
@@ -1557,7 +1531,19 @@
                 <a:ea typeface="+mn-ea"/>
                 <a:cs typeface="+mn-cs"/>
               </a:rPr>
-              <a:t>variables </a:t>
+              <a:t>.) canopy-corrected mean annual irradiance (MJ/m2/year), R2 = , modelled change (%) = , p = ; </a:t>
+            </a:r>
+            <a:r>
+              <a:rPr lang="en-AU" sz="1680" kern="1200" dirty="0" err="1" smtClean="0">
+                <a:solidFill>
+                  <a:schemeClr val="tx1"/>
+                </a:solidFill>
+                <a:effectLst/>
+                <a:latin typeface="+mn-lt"/>
+                <a:ea typeface="+mn-ea"/>
+                <a:cs typeface="+mn-cs"/>
+              </a:rPr>
+              <a:t>iii,iv</a:t>
             </a:r>
             <a:r>
               <a:rPr lang="en-AU" sz="1680" kern="1200" dirty="0" smtClean="0">
@@ -1569,7 +1555,439 @@
                 <a:ea typeface="+mn-ea"/>
                 <a:cs typeface="+mn-cs"/>
               </a:rPr>
-              <a:t>are represented by coloured tiles where p &lt; 0.05. Protein abundances on a per leaf area basis (mg protein / m2 leaf area) are used to calculate correlations presented in the bottom/right diagonal and proportional protein abundances (i.e. fraction of total leaf protein abundance) are used to calculate correlations presented in the top/left diagonal.</a:t>
+              <a:t>.) mean annual precipitation (MAP, mm/year) R2 = , modelled change (%) = , p = ; </a:t>
+            </a:r>
+            <a:r>
+              <a:rPr lang="en-AU" sz="1680" kern="1200" dirty="0" err="1" smtClean="0">
+                <a:solidFill>
+                  <a:schemeClr val="tx1"/>
+                </a:solidFill>
+                <a:effectLst/>
+                <a:latin typeface="+mn-lt"/>
+                <a:ea typeface="+mn-ea"/>
+                <a:cs typeface="+mn-cs"/>
+              </a:rPr>
+              <a:t>v,vi</a:t>
+            </a:r>
+            <a:r>
+              <a:rPr lang="en-AU" sz="1680" kern="1200" dirty="0" smtClean="0">
+                <a:solidFill>
+                  <a:schemeClr val="tx1"/>
+                </a:solidFill>
+                <a:effectLst/>
+                <a:latin typeface="+mn-lt"/>
+                <a:ea typeface="+mn-ea"/>
+                <a:cs typeface="+mn-cs"/>
+              </a:rPr>
+              <a:t>.) mean annual temperature (MAT, </a:t>
+            </a:r>
+            <a:r>
+              <a:rPr lang="en-AU" sz="1680" kern="1200" dirty="0" err="1" smtClean="0">
+                <a:solidFill>
+                  <a:schemeClr val="tx1"/>
+                </a:solidFill>
+                <a:effectLst/>
+                <a:latin typeface="+mn-lt"/>
+                <a:ea typeface="+mn-ea"/>
+                <a:cs typeface="+mn-cs"/>
+              </a:rPr>
+              <a:t>oC</a:t>
+            </a:r>
+            <a:r>
+              <a:rPr lang="en-AU" sz="1680" kern="1200" dirty="0" smtClean="0">
+                <a:solidFill>
+                  <a:schemeClr val="tx1"/>
+                </a:solidFill>
+                <a:effectLst/>
+                <a:latin typeface="+mn-lt"/>
+                <a:ea typeface="+mn-ea"/>
+                <a:cs typeface="+mn-cs"/>
+              </a:rPr>
+              <a:t>) R2 = , modelled change (%) = , p =.</a:t>
+            </a:r>
+          </a:p>
+          <a:p>
+            <a:endParaRPr lang="en-AU" sz="1680" kern="1200" dirty="0" smtClean="0">
+              <a:solidFill>
+                <a:schemeClr val="tx1"/>
+              </a:solidFill>
+              <a:effectLst/>
+              <a:latin typeface="+mn-lt"/>
+              <a:ea typeface="+mn-ea"/>
+              <a:cs typeface="+mn-cs"/>
+            </a:endParaRPr>
+          </a:p>
+          <a:p>
+            <a:r>
+              <a:rPr lang="en-AU" sz="1680" kern="1200" dirty="0" smtClean="0">
+                <a:solidFill>
+                  <a:schemeClr val="tx1"/>
+                </a:solidFill>
+                <a:effectLst/>
+                <a:latin typeface="+mn-lt"/>
+                <a:ea typeface="+mn-ea"/>
+                <a:cs typeface="+mn-cs"/>
+              </a:rPr>
+              <a:t>Points represent the average protein abundance for individual species * site combinations (n = 9, 3 leaves from each of 3 individuals). SEM error bars are presented for protein abundances and for canopy-corrected irradiances, since mean canopy openness values are derived from measurements of three individuals. Model fits (OLS regression) are shown where p &lt; 0.05. A full table of univariate OLS regression statistics associated with Fig </a:t>
+            </a:r>
+            <a:r>
+              <a:rPr lang="en-AU" sz="1680" kern="1200" dirty="0" err="1" smtClean="0">
+                <a:solidFill>
+                  <a:schemeClr val="tx1"/>
+                </a:solidFill>
+                <a:effectLst/>
+                <a:latin typeface="+mn-lt"/>
+                <a:ea typeface="+mn-ea"/>
+                <a:cs typeface="+mn-cs"/>
+              </a:rPr>
+              <a:t>Xb</a:t>
+            </a:r>
+            <a:r>
+              <a:rPr lang="en-AU" sz="1680" kern="1200" dirty="0" smtClean="0">
+                <a:solidFill>
+                  <a:schemeClr val="tx1"/>
+                </a:solidFill>
+                <a:effectLst/>
+                <a:latin typeface="+mn-lt"/>
+                <a:ea typeface="+mn-ea"/>
+                <a:cs typeface="+mn-cs"/>
+              </a:rPr>
+              <a:t> and </a:t>
+            </a:r>
+            <a:r>
+              <a:rPr lang="en-AU" sz="1680" kern="1200" dirty="0" err="1" smtClean="0">
+                <a:solidFill>
+                  <a:schemeClr val="tx1"/>
+                </a:solidFill>
+                <a:effectLst/>
+                <a:latin typeface="+mn-lt"/>
+                <a:ea typeface="+mn-ea"/>
+                <a:cs typeface="+mn-cs"/>
+              </a:rPr>
+              <a:t>Xc</a:t>
+            </a:r>
+            <a:r>
+              <a:rPr lang="en-AU" sz="1680" kern="1200" dirty="0" smtClean="0">
+                <a:solidFill>
+                  <a:schemeClr val="tx1"/>
+                </a:solidFill>
+                <a:effectLst/>
+                <a:latin typeface="+mn-lt"/>
+                <a:ea typeface="+mn-ea"/>
+                <a:cs typeface="+mn-cs"/>
+              </a:rPr>
+              <a:t> is provided in the supplementary materials.</a:t>
+            </a:r>
+          </a:p>
+          <a:p>
+            <a:endParaRPr lang="en-AU" sz="1680" kern="1200" dirty="0" smtClean="0">
+              <a:solidFill>
+                <a:schemeClr val="tx1"/>
+              </a:solidFill>
+              <a:effectLst/>
+              <a:latin typeface="+mn-lt"/>
+              <a:ea typeface="+mn-ea"/>
+              <a:cs typeface="+mn-cs"/>
+            </a:endParaRPr>
+          </a:p>
+          <a:p>
+            <a:r>
+              <a:rPr lang="en-AU" sz="1680" kern="1200" dirty="0" smtClean="0">
+                <a:solidFill>
+                  <a:schemeClr val="tx1"/>
+                </a:solidFill>
+                <a:effectLst/>
+                <a:latin typeface="+mn-lt"/>
+                <a:ea typeface="+mn-ea"/>
+                <a:cs typeface="+mn-cs"/>
+              </a:rPr>
+              <a:t>The top row of the lower panel (</a:t>
+            </a:r>
+            <a:r>
+              <a:rPr lang="en-AU" sz="1680" kern="1200" dirty="0" err="1" smtClean="0">
+                <a:solidFill>
+                  <a:schemeClr val="tx1"/>
+                </a:solidFill>
+                <a:effectLst/>
+                <a:latin typeface="+mn-lt"/>
+                <a:ea typeface="+mn-ea"/>
+                <a:cs typeface="+mn-cs"/>
+              </a:rPr>
+              <a:t>i</a:t>
+            </a:r>
+            <a:r>
+              <a:rPr lang="en-AU" sz="1680" kern="1200" dirty="0" smtClean="0">
+                <a:solidFill>
+                  <a:schemeClr val="tx1"/>
+                </a:solidFill>
+                <a:effectLst/>
+                <a:latin typeface="+mn-lt"/>
+                <a:ea typeface="+mn-ea"/>
+                <a:cs typeface="+mn-cs"/>
+              </a:rPr>
+              <a:t>, iii, v) shows models fit using protein abundances expressed on a proportional basis; the bottom row (ii, iv, vi,) shows models fit using protein abundances expressed on a per leaf area basis (mg protein / m2 leaf area). </a:t>
+            </a:r>
+          </a:p>
+          <a:p>
+            <a:endParaRPr lang="en-AU" sz="1680" kern="1200" dirty="0" smtClean="0">
+              <a:solidFill>
+                <a:schemeClr val="tx1"/>
+              </a:solidFill>
+              <a:effectLst/>
+              <a:latin typeface="+mn-lt"/>
+              <a:ea typeface="+mn-ea"/>
+              <a:cs typeface="+mn-cs"/>
+            </a:endParaRPr>
+          </a:p>
+          <a:p>
+            <a:r>
+              <a:rPr lang="en-AU" sz="1680" kern="1200" dirty="0" smtClean="0">
+                <a:solidFill>
+                  <a:schemeClr val="tx1"/>
+                </a:solidFill>
+                <a:effectLst/>
+                <a:latin typeface="+mn-lt"/>
+                <a:ea typeface="+mn-ea"/>
+                <a:cs typeface="+mn-cs"/>
+              </a:rPr>
+              <a:t>c.) Influence of leaf traits on photosynthetic protein abundance: </a:t>
+            </a:r>
+          </a:p>
+          <a:p>
+            <a:endParaRPr lang="en-AU" sz="1680" kern="1200" dirty="0" smtClean="0">
+              <a:solidFill>
+                <a:schemeClr val="tx1"/>
+              </a:solidFill>
+              <a:effectLst/>
+              <a:latin typeface="+mn-lt"/>
+              <a:ea typeface="+mn-ea"/>
+              <a:cs typeface="+mn-cs"/>
+            </a:endParaRPr>
+          </a:p>
+          <a:p>
+            <a:r>
+              <a:rPr lang="en-AU" sz="1680" kern="1200" dirty="0" err="1" smtClean="0">
+                <a:solidFill>
+                  <a:schemeClr val="tx1"/>
+                </a:solidFill>
+                <a:effectLst/>
+                <a:latin typeface="+mn-lt"/>
+                <a:ea typeface="+mn-ea"/>
+                <a:cs typeface="+mn-cs"/>
+              </a:rPr>
+              <a:t>i</a:t>
+            </a:r>
+            <a:r>
+              <a:rPr lang="en-AU" sz="1680" kern="1200" dirty="0" smtClean="0">
+                <a:solidFill>
+                  <a:schemeClr val="tx1"/>
+                </a:solidFill>
+                <a:effectLst/>
+                <a:latin typeface="+mn-lt"/>
+                <a:ea typeface="+mn-ea"/>
+                <a:cs typeface="+mn-cs"/>
+              </a:rPr>
+              <a:t>.) Neither photosystems nor Calvin cycle enzymes change proportionally in response to total leaf protein, p = , R2 = ; ii.) on a per leaf area basis, abundances of both functional categories strongly track leaf total protein, although there is more variation associated with photosystem protein abundances than Calvin cycle protein abundances. iii.) Proportional abundance of photosystem proteins declines as leaf mass per area (LMA, g/m2) increases (R2 = , p = ), but no such trend is apparent for Calvin cycle proteins (p = , R2 = ); iv.) On a per leaf area basis, abundance of Calvin cycle proteins increases with LMA (R2 =, p  = ), while photosystem protein abundance does not change (R2 = , p = ). </a:t>
+            </a:r>
+          </a:p>
+          <a:p>
+            <a:endParaRPr lang="en-AU" sz="1680" kern="1200" dirty="0" smtClean="0">
+              <a:solidFill>
+                <a:schemeClr val="tx1"/>
+              </a:solidFill>
+              <a:effectLst/>
+              <a:latin typeface="+mn-lt"/>
+              <a:ea typeface="+mn-ea"/>
+              <a:cs typeface="+mn-cs"/>
+            </a:endParaRPr>
+          </a:p>
+          <a:p>
+            <a:r>
+              <a:rPr lang="en-AU" sz="1680" kern="1200" dirty="0" smtClean="0">
+                <a:solidFill>
+                  <a:schemeClr val="tx1"/>
+                </a:solidFill>
+                <a:effectLst/>
+                <a:latin typeface="+mn-lt"/>
+                <a:ea typeface="+mn-ea"/>
+                <a:cs typeface="+mn-cs"/>
+              </a:rPr>
+              <a:t>d.) Multiple regression models visualised using coloration to indicate the modelled magnitude of protein abundance in two-dimensional environmental space. Curved contours indicate significant interaction effects between predictors. A full table of multiple regression statistics is presented in the supplementary materials.</a:t>
+            </a:r>
+          </a:p>
+          <a:p>
+            <a:endParaRPr lang="en-AU" sz="1680" b="0" kern="1200" baseline="0" dirty="0" smtClean="0">
+              <a:solidFill>
+                <a:schemeClr val="tx1"/>
+              </a:solidFill>
+              <a:effectLst/>
+              <a:latin typeface="+mn-lt"/>
+              <a:ea typeface="+mn-ea"/>
+              <a:cs typeface="+mn-cs"/>
+            </a:endParaRPr>
+          </a:p>
+          <a:p>
+            <a:r>
+              <a:rPr lang="en-AU" sz="1680" b="0" kern="1200" baseline="0" smtClean="0">
+                <a:solidFill>
+                  <a:schemeClr val="tx1"/>
+                </a:solidFill>
+                <a:effectLst/>
+                <a:latin typeface="+mn-lt"/>
+                <a:ea typeface="+mn-ea"/>
+                <a:cs typeface="+mn-cs"/>
+              </a:rPr>
+              <a:t>TO COMPLETE</a:t>
+            </a:r>
+            <a:endParaRPr lang="en-AU" b="0" baseline="0" dirty="0" smtClean="0"/>
+          </a:p>
+        </p:txBody>
+      </p:sp>
+      <p:sp>
+        <p:nvSpPr>
+          <p:cNvPr id="4" name="Slide Number Placeholder 3"/>
+          <p:cNvSpPr>
+            <a:spLocks noGrp="1"/>
+          </p:cNvSpPr>
+          <p:nvPr>
+            <p:ph type="sldNum" sz="quarter" idx="10"/>
+          </p:nvPr>
+        </p:nvSpPr>
+        <p:spPr/>
+        <p:txBody>
+          <a:bodyPr/>
+          <a:lstStyle/>
+          <a:p>
+            <a:fld id="{C73DF9B0-E08B-4862-93DE-9A4C9A8C6C80}" type="slidenum">
+              <a:rPr lang="en-AU" smtClean="0"/>
+              <a:t>4</a:t>
+            </a:fld>
+            <a:endParaRPr lang="en-AU"/>
+          </a:p>
+        </p:txBody>
+      </p:sp>
+    </p:spTree>
+    <p:extLst>
+      <p:ext uri="{BB962C8B-B14F-4D97-AF65-F5344CB8AC3E}">
+        <p14:creationId xmlns:p14="http://schemas.microsoft.com/office/powerpoint/2010/main" val="2898664389"/>
+      </p:ext>
+    </p:extLst>
+  </p:cSld>
+  <p:clrMapOvr>
+    <a:masterClrMapping/>
+  </p:clrMapOvr>
+</p:notes>
+</file>
+
+<file path=ppt/notesSlides/notesSlide5.xml><?xml version="1.0" encoding="utf-8"?>
+<p:notes xmlns:a="http://schemas.openxmlformats.org/drawingml/2006/main" xmlns:r="http://schemas.openxmlformats.org/officeDocument/2006/relationships" xmlns:p="http://schemas.openxmlformats.org/presentationml/2006/main">
+  <p:cSld>
+    <p:spTree>
+      <p:nvGrpSpPr>
+        <p:cNvPr id="1" name=""/>
+        <p:cNvGrpSpPr/>
+        <p:nvPr/>
+      </p:nvGrpSpPr>
+      <p:grpSpPr>
+        <a:xfrm>
+          <a:off x="0" y="0"/>
+          <a:ext cx="0" cy="0"/>
+          <a:chOff x="0" y="0"/>
+          <a:chExt cx="0" cy="0"/>
+        </a:xfrm>
+      </p:grpSpPr>
+      <p:sp>
+        <p:nvSpPr>
+          <p:cNvPr id="2" name="Slide Image Placeholder 1"/>
+          <p:cNvSpPr>
+            <a:spLocks noGrp="1" noRot="1" noChangeAspect="1"/>
+          </p:cNvSpPr>
+          <p:nvPr>
+            <p:ph type="sldImg"/>
+          </p:nvPr>
+        </p:nvSpPr>
+        <p:spPr>
+          <a:xfrm>
+            <a:off x="2271713" y="1143000"/>
+            <a:ext cx="2314575" cy="3086100"/>
+          </a:xfrm>
+        </p:spPr>
+      </p:sp>
+      <p:sp>
+        <p:nvSpPr>
+          <p:cNvPr id="3" name="Notes Placeholder 2"/>
+          <p:cNvSpPr>
+            <a:spLocks noGrp="1"/>
+          </p:cNvSpPr>
+          <p:nvPr>
+            <p:ph type="body" idx="1"/>
+          </p:nvPr>
+        </p:nvSpPr>
+        <p:spPr/>
+        <p:txBody>
+          <a:bodyPr/>
+          <a:lstStyle/>
+          <a:p>
+            <a:r>
+              <a:rPr lang="en-AU" sz="1680" b="1" kern="1200" dirty="0" smtClean="0">
+                <a:solidFill>
+                  <a:schemeClr val="tx1"/>
+                </a:solidFill>
+                <a:effectLst/>
+                <a:latin typeface="+mn-lt"/>
+                <a:ea typeface="+mn-ea"/>
+                <a:cs typeface="+mn-cs"/>
+              </a:rPr>
+              <a:t>3.) Linking leaf protein abundances with environment and functional traits. </a:t>
+            </a:r>
+          </a:p>
+          <a:p>
+            <a:endParaRPr lang="en-AU" sz="1680" kern="1200" dirty="0" smtClean="0">
+              <a:solidFill>
+                <a:schemeClr val="tx1"/>
+              </a:solidFill>
+              <a:effectLst/>
+              <a:latin typeface="+mn-lt"/>
+              <a:ea typeface="+mn-ea"/>
+              <a:cs typeface="+mn-cs"/>
+            </a:endParaRPr>
+          </a:p>
+          <a:p>
+            <a:r>
+              <a:rPr lang="en-AU" sz="1680" kern="1200" dirty="0" smtClean="0">
+                <a:solidFill>
+                  <a:schemeClr val="tx1"/>
+                </a:solidFill>
+                <a:effectLst/>
+                <a:latin typeface="+mn-lt"/>
+                <a:ea typeface="+mn-ea"/>
+                <a:cs typeface="+mn-cs"/>
+              </a:rPr>
+              <a:t>a.) We are able to assess wide-area environmental patterns of leaf proteins with specific function, at any level of protein organisation. Here we show a </a:t>
+            </a:r>
+            <a:r>
+              <a:rPr lang="en-AU" sz="1680" kern="1200" dirty="0" err="1" smtClean="0">
+                <a:solidFill>
+                  <a:schemeClr val="tx1"/>
+                </a:solidFill>
+                <a:effectLst/>
+                <a:latin typeface="+mn-lt"/>
+                <a:ea typeface="+mn-ea"/>
+                <a:cs typeface="+mn-cs"/>
+              </a:rPr>
+              <a:t>heatmap</a:t>
+            </a:r>
+            <a:r>
+              <a:rPr lang="en-AU" sz="1680" kern="1200" dirty="0" smtClean="0">
+                <a:solidFill>
+                  <a:schemeClr val="tx1"/>
+                </a:solidFill>
+                <a:effectLst/>
+                <a:latin typeface="+mn-lt"/>
+                <a:ea typeface="+mn-ea"/>
+                <a:cs typeface="+mn-cs"/>
+              </a:rPr>
+              <a:t> of correlations between environmental variables, functional traits, gas exchange measurements and major protein functional categories. Pearson correlations between pairs of variables are represented by coloured tiles where p &lt; 0.05. Protein abundances on a per leaf area basis (mg protein / m2 leaf area) are used to calculate correlations presented in the bottom/right diagonal and proportional protein abundances (i.e. fraction of total leaf protein abundance) are used to calculate correlations presented in the top/left diagonal.</a:t>
             </a:r>
           </a:p>
           <a:p>
@@ -2164,7 +2582,7 @@
           <a:p>
             <a:fld id="{C73DF9B0-E08B-4862-93DE-9A4C9A8C6C80}" type="slidenum">
               <a:rPr lang="en-AU" smtClean="0"/>
-              <a:t>4</a:t>
+              <a:t>5</a:t>
             </a:fld>
             <a:endParaRPr lang="en-AU"/>
           </a:p>
@@ -2314,7 +2732,7 @@
           <a:p>
             <a:fld id="{DBF67EF4-3E3F-41D9-AB59-178FFA85FB21}" type="datetimeFigureOut">
               <a:rPr lang="en-AU" smtClean="0"/>
-              <a:t>11/07/2017</a:t>
+              <a:t>13/07/2017</a:t>
             </a:fld>
             <a:endParaRPr lang="en-AU"/>
           </a:p>
@@ -2484,7 +2902,7 @@
           <a:p>
             <a:fld id="{DBF67EF4-3E3F-41D9-AB59-178FFA85FB21}" type="datetimeFigureOut">
               <a:rPr lang="en-AU" smtClean="0"/>
-              <a:t>11/07/2017</a:t>
+              <a:t>13/07/2017</a:t>
             </a:fld>
             <a:endParaRPr lang="en-AU"/>
           </a:p>
@@ -2664,7 +3082,7 @@
           <a:p>
             <a:fld id="{DBF67EF4-3E3F-41D9-AB59-178FFA85FB21}" type="datetimeFigureOut">
               <a:rPr lang="en-AU" smtClean="0"/>
-              <a:t>11/07/2017</a:t>
+              <a:t>13/07/2017</a:t>
             </a:fld>
             <a:endParaRPr lang="en-AU"/>
           </a:p>
@@ -2834,7 +3252,7 @@
           <a:p>
             <a:fld id="{DBF67EF4-3E3F-41D9-AB59-178FFA85FB21}" type="datetimeFigureOut">
               <a:rPr lang="en-AU" smtClean="0"/>
-              <a:t>11/07/2017</a:t>
+              <a:t>13/07/2017</a:t>
             </a:fld>
             <a:endParaRPr lang="en-AU"/>
           </a:p>
@@ -3078,7 +3496,7 @@
           <a:p>
             <a:fld id="{DBF67EF4-3E3F-41D9-AB59-178FFA85FB21}" type="datetimeFigureOut">
               <a:rPr lang="en-AU" smtClean="0"/>
-              <a:t>11/07/2017</a:t>
+              <a:t>13/07/2017</a:t>
             </a:fld>
             <a:endParaRPr lang="en-AU"/>
           </a:p>
@@ -3310,7 +3728,7 @@
           <a:p>
             <a:fld id="{DBF67EF4-3E3F-41D9-AB59-178FFA85FB21}" type="datetimeFigureOut">
               <a:rPr lang="en-AU" smtClean="0"/>
-              <a:t>11/07/2017</a:t>
+              <a:t>13/07/2017</a:t>
             </a:fld>
             <a:endParaRPr lang="en-AU"/>
           </a:p>
@@ -3677,7 +4095,7 @@
           <a:p>
             <a:fld id="{DBF67EF4-3E3F-41D9-AB59-178FFA85FB21}" type="datetimeFigureOut">
               <a:rPr lang="en-AU" smtClean="0"/>
-              <a:t>11/07/2017</a:t>
+              <a:t>13/07/2017</a:t>
             </a:fld>
             <a:endParaRPr lang="en-AU"/>
           </a:p>
@@ -3795,7 +4213,7 @@
           <a:p>
             <a:fld id="{DBF67EF4-3E3F-41D9-AB59-178FFA85FB21}" type="datetimeFigureOut">
               <a:rPr lang="en-AU" smtClean="0"/>
-              <a:t>11/07/2017</a:t>
+              <a:t>13/07/2017</a:t>
             </a:fld>
             <a:endParaRPr lang="en-AU"/>
           </a:p>
@@ -3890,7 +4308,7 @@
           <a:p>
             <a:fld id="{DBF67EF4-3E3F-41D9-AB59-178FFA85FB21}" type="datetimeFigureOut">
               <a:rPr lang="en-AU" smtClean="0"/>
-              <a:t>11/07/2017</a:t>
+              <a:t>13/07/2017</a:t>
             </a:fld>
             <a:endParaRPr lang="en-AU"/>
           </a:p>
@@ -4167,7 +4585,7 @@
           <a:p>
             <a:fld id="{DBF67EF4-3E3F-41D9-AB59-178FFA85FB21}" type="datetimeFigureOut">
               <a:rPr lang="en-AU" smtClean="0"/>
-              <a:t>11/07/2017</a:t>
+              <a:t>13/07/2017</a:t>
             </a:fld>
             <a:endParaRPr lang="en-AU"/>
           </a:p>
@@ -4424,7 +4842,7 @@
           <a:p>
             <a:fld id="{DBF67EF4-3E3F-41D9-AB59-178FFA85FB21}" type="datetimeFigureOut">
               <a:rPr lang="en-AU" smtClean="0"/>
-              <a:t>11/07/2017</a:t>
+              <a:t>13/07/2017</a:t>
             </a:fld>
             <a:endParaRPr lang="en-AU"/>
           </a:p>
@@ -4637,7 +5055,7 @@
           <a:p>
             <a:fld id="{DBF67EF4-3E3F-41D9-AB59-178FFA85FB21}" type="datetimeFigureOut">
               <a:rPr lang="en-AU" smtClean="0"/>
-              <a:t>11/07/2017</a:t>
+              <a:t>13/07/2017</a:t>
             </a:fld>
             <a:endParaRPr lang="en-AU"/>
           </a:p>
@@ -5071,7 +5489,7 @@
           <p:cNvPr id="20" name="TextBox 19">
             <a:extLst>
               <a:ext uri="{FF2B5EF4-FFF2-40B4-BE49-F238E27FC236}">
-                <a16:creationId xmlns="" xmlns:a16="http://schemas.microsoft.com/office/drawing/2014/main" id="{036694F8-822A-4EA9-A83F-BB11CF14A3AC}"/>
+                <a16:creationId xmlns:a16="http://schemas.microsoft.com/office/drawing/2014/main" xmlns="" id="{036694F8-822A-4EA9-A83F-BB11CF14A3AC}"/>
               </a:ext>
             </a:extLst>
           </p:cNvPr>
@@ -5426,7 +5844,7 @@
           <p:cNvPr id="13" name="Group 12">
             <a:extLst>
               <a:ext uri="{FF2B5EF4-FFF2-40B4-BE49-F238E27FC236}">
-                <a16:creationId xmlns="" xmlns:a16="http://schemas.microsoft.com/office/drawing/2014/main" id="{C9FFF9FF-C604-459E-BA51-CAAD744824C9}"/>
+                <a16:creationId xmlns:a16="http://schemas.microsoft.com/office/drawing/2014/main" xmlns="" id="{C9FFF9FF-C604-459E-BA51-CAAD744824C9}"/>
               </a:ext>
             </a:extLst>
           </p:cNvPr>
@@ -5446,7 +5864,7 @@
             <p:cNvPr id="14" name="Picture 13" descr="abundance_rank_90pc.png">
               <a:extLst>
                 <a:ext uri="{FF2B5EF4-FFF2-40B4-BE49-F238E27FC236}">
-                  <a16:creationId xmlns="" xmlns:a16="http://schemas.microsoft.com/office/drawing/2014/main" id="{34BBFF6D-3CCF-4CB2-B743-963595FCD805}"/>
+                  <a16:creationId xmlns:a16="http://schemas.microsoft.com/office/drawing/2014/main" xmlns="" id="{34BBFF6D-3CCF-4CB2-B743-963595FCD805}"/>
                 </a:ext>
               </a:extLst>
             </p:cNvPr>
@@ -5482,7 +5900,7 @@
             <p:cNvPr id="15" name="TextBox 14">
               <a:extLst>
                 <a:ext uri="{FF2B5EF4-FFF2-40B4-BE49-F238E27FC236}">
-                  <a16:creationId xmlns="" xmlns:a16="http://schemas.microsoft.com/office/drawing/2014/main" id="{589E7152-499C-44E8-BA29-4777970B8AAA}"/>
+                  <a16:creationId xmlns:a16="http://schemas.microsoft.com/office/drawing/2014/main" xmlns="" id="{589E7152-499C-44E8-BA29-4777970B8AAA}"/>
                 </a:ext>
               </a:extLst>
             </p:cNvPr>
@@ -5718,6 +6136,1375 @@
       </p:grpSpPr>
       <p:grpSp>
         <p:nvGrpSpPr>
+          <p:cNvPr id="10" name="Group 9"/>
+          <p:cNvGrpSpPr/>
+          <p:nvPr/>
+        </p:nvGrpSpPr>
+        <p:grpSpPr>
+          <a:xfrm>
+            <a:off x="624223" y="7335444"/>
+            <a:ext cx="5314045" cy="3596627"/>
+            <a:chOff x="454288" y="7049499"/>
+            <a:chExt cx="5314045" cy="3596627"/>
+          </a:xfrm>
+        </p:grpSpPr>
+        <p:pic>
+          <p:nvPicPr>
+            <p:cNvPr id="55" name="Picture 54"/>
+            <p:cNvPicPr>
+              <a:picLocks noChangeAspect="1"/>
+            </p:cNvPicPr>
+            <p:nvPr/>
+          </p:nvPicPr>
+          <p:blipFill>
+            <a:blip r:embed="rId3" cstate="print">
+              <a:extLst>
+                <a:ext uri="{28A0092B-C50C-407E-A947-70E740481C1C}">
+                  <a14:useLocalDpi xmlns:a14="http://schemas.microsoft.com/office/drawing/2010/main" val="0"/>
+                </a:ext>
+              </a:extLst>
+            </a:blip>
+            <a:stretch>
+              <a:fillRect/>
+            </a:stretch>
+          </p:blipFill>
+          <p:spPr>
+            <a:xfrm>
+              <a:off x="3975571" y="7583390"/>
+              <a:ext cx="1697164" cy="1501981"/>
+            </a:xfrm>
+            <a:prstGeom prst="rect">
+              <a:avLst/>
+            </a:prstGeom>
+          </p:spPr>
+        </p:pic>
+        <p:pic>
+          <p:nvPicPr>
+            <p:cNvPr id="56" name="Picture 55"/>
+            <p:cNvPicPr>
+              <a:picLocks noChangeAspect="1"/>
+            </p:cNvPicPr>
+            <p:nvPr/>
+          </p:nvPicPr>
+          <p:blipFill>
+            <a:blip r:embed="rId4" cstate="print">
+              <a:extLst>
+                <a:ext uri="{28A0092B-C50C-407E-A947-70E740481C1C}">
+                  <a14:useLocalDpi xmlns:a14="http://schemas.microsoft.com/office/drawing/2010/main" val="0"/>
+                </a:ext>
+              </a:extLst>
+            </a:blip>
+            <a:stretch>
+              <a:fillRect/>
+            </a:stretch>
+          </p:blipFill>
+          <p:spPr>
+            <a:xfrm>
+              <a:off x="4071169" y="9144145"/>
+              <a:ext cx="1697164" cy="1501981"/>
+            </a:xfrm>
+            <a:prstGeom prst="rect">
+              <a:avLst/>
+            </a:prstGeom>
+          </p:spPr>
+        </p:pic>
+        <p:pic>
+          <p:nvPicPr>
+            <p:cNvPr id="59" name="Picture 58"/>
+            <p:cNvPicPr>
+              <a:picLocks noChangeAspect="1"/>
+            </p:cNvPicPr>
+            <p:nvPr/>
+          </p:nvPicPr>
+          <p:blipFill>
+            <a:blip r:embed="rId5" cstate="print">
+              <a:extLst>
+                <a:ext uri="{28A0092B-C50C-407E-A947-70E740481C1C}">
+                  <a14:useLocalDpi xmlns:a14="http://schemas.microsoft.com/office/drawing/2010/main" val="0"/>
+                </a:ext>
+              </a:extLst>
+            </a:blip>
+            <a:stretch>
+              <a:fillRect/>
+            </a:stretch>
+          </p:blipFill>
+          <p:spPr>
+            <a:xfrm>
+              <a:off x="2206873" y="7583795"/>
+              <a:ext cx="1697164" cy="1501981"/>
+            </a:xfrm>
+            <a:prstGeom prst="rect">
+              <a:avLst/>
+            </a:prstGeom>
+          </p:spPr>
+        </p:pic>
+        <p:pic>
+          <p:nvPicPr>
+            <p:cNvPr id="60" name="Picture 59"/>
+            <p:cNvPicPr>
+              <a:picLocks noChangeAspect="1"/>
+            </p:cNvPicPr>
+            <p:nvPr/>
+          </p:nvPicPr>
+          <p:blipFill>
+            <a:blip r:embed="rId6" cstate="print">
+              <a:extLst>
+                <a:ext uri="{28A0092B-C50C-407E-A947-70E740481C1C}">
+                  <a14:useLocalDpi xmlns:a14="http://schemas.microsoft.com/office/drawing/2010/main" val="0"/>
+                </a:ext>
+              </a:extLst>
+            </a:blip>
+            <a:stretch>
+              <a:fillRect/>
+            </a:stretch>
+          </p:blipFill>
+          <p:spPr>
+            <a:xfrm>
+              <a:off x="2302471" y="9144145"/>
+              <a:ext cx="1697164" cy="1501981"/>
+            </a:xfrm>
+            <a:prstGeom prst="rect">
+              <a:avLst/>
+            </a:prstGeom>
+          </p:spPr>
+        </p:pic>
+        <p:pic>
+          <p:nvPicPr>
+            <p:cNvPr id="61" name="Picture 60"/>
+            <p:cNvPicPr>
+              <a:picLocks noChangeAspect="1"/>
+            </p:cNvPicPr>
+            <p:nvPr/>
+          </p:nvPicPr>
+          <p:blipFill>
+            <a:blip r:embed="rId7" cstate="print">
+              <a:extLst>
+                <a:ext uri="{28A0092B-C50C-407E-A947-70E740481C1C}">
+                  <a14:useLocalDpi xmlns:a14="http://schemas.microsoft.com/office/drawing/2010/main" val="0"/>
+                </a:ext>
+              </a:extLst>
+            </a:blip>
+            <a:stretch>
+              <a:fillRect/>
+            </a:stretch>
+          </p:blipFill>
+          <p:spPr>
+            <a:xfrm>
+              <a:off x="454288" y="7557046"/>
+              <a:ext cx="1697164" cy="1501981"/>
+            </a:xfrm>
+            <a:prstGeom prst="rect">
+              <a:avLst/>
+            </a:prstGeom>
+          </p:spPr>
+        </p:pic>
+        <p:pic>
+          <p:nvPicPr>
+            <p:cNvPr id="62" name="Picture 61"/>
+            <p:cNvPicPr>
+              <a:picLocks noChangeAspect="1"/>
+            </p:cNvPicPr>
+            <p:nvPr/>
+          </p:nvPicPr>
+          <p:blipFill>
+            <a:blip r:embed="rId8" cstate="print">
+              <a:extLst>
+                <a:ext uri="{28A0092B-C50C-407E-A947-70E740481C1C}">
+                  <a14:useLocalDpi xmlns:a14="http://schemas.microsoft.com/office/drawing/2010/main" val="0"/>
+                </a:ext>
+              </a:extLst>
+            </a:blip>
+            <a:stretch>
+              <a:fillRect/>
+            </a:stretch>
+          </p:blipFill>
+          <p:spPr>
+            <a:xfrm>
+              <a:off x="525822" y="9144145"/>
+              <a:ext cx="1697164" cy="1501981"/>
+            </a:xfrm>
+            <a:prstGeom prst="rect">
+              <a:avLst/>
+            </a:prstGeom>
+          </p:spPr>
+        </p:pic>
+        <p:sp>
+          <p:nvSpPr>
+            <p:cNvPr id="67" name="TextBox 66"/>
+            <p:cNvSpPr txBox="1"/>
+            <p:nvPr/>
+          </p:nvSpPr>
+          <p:spPr>
+            <a:xfrm>
+              <a:off x="640086" y="7355928"/>
+              <a:ext cx="133475" cy="261610"/>
+            </a:xfrm>
+            <a:prstGeom prst="rect">
+              <a:avLst/>
+            </a:prstGeom>
+            <a:noFill/>
+          </p:spPr>
+          <p:txBody>
+            <a:bodyPr wrap="square" rtlCol="0">
+              <a:spAutoFit/>
+            </a:bodyPr>
+            <a:lstStyle/>
+            <a:p>
+              <a:r>
+                <a:rPr lang="en-AU" sz="1100" dirty="0" err="1"/>
+                <a:t>i</a:t>
+              </a:r>
+              <a:endParaRPr lang="en-AU" sz="1200" dirty="0"/>
+            </a:p>
+          </p:txBody>
+        </p:sp>
+        <p:sp>
+          <p:nvSpPr>
+            <p:cNvPr id="68" name="TextBox 67"/>
+            <p:cNvSpPr txBox="1"/>
+            <p:nvPr/>
+          </p:nvSpPr>
+          <p:spPr>
+            <a:xfrm>
+              <a:off x="2532879" y="7403827"/>
+              <a:ext cx="467155" cy="276999"/>
+            </a:xfrm>
+            <a:prstGeom prst="rect">
+              <a:avLst/>
+            </a:prstGeom>
+            <a:noFill/>
+          </p:spPr>
+          <p:txBody>
+            <a:bodyPr wrap="square" rtlCol="0">
+              <a:spAutoFit/>
+            </a:bodyPr>
+            <a:lstStyle/>
+            <a:p>
+              <a:r>
+                <a:rPr lang="en-AU" sz="1200" dirty="0"/>
+                <a:t>iii</a:t>
+              </a:r>
+            </a:p>
+          </p:txBody>
+        </p:sp>
+        <p:sp>
+          <p:nvSpPr>
+            <p:cNvPr id="69" name="TextBox 68"/>
+            <p:cNvSpPr txBox="1"/>
+            <p:nvPr/>
+          </p:nvSpPr>
+          <p:spPr>
+            <a:xfrm>
+              <a:off x="4204695" y="7403827"/>
+              <a:ext cx="368113" cy="261610"/>
+            </a:xfrm>
+            <a:prstGeom prst="rect">
+              <a:avLst/>
+            </a:prstGeom>
+            <a:noFill/>
+          </p:spPr>
+          <p:txBody>
+            <a:bodyPr wrap="square" rtlCol="0">
+              <a:spAutoFit/>
+            </a:bodyPr>
+            <a:lstStyle/>
+            <a:p>
+              <a:r>
+                <a:rPr lang="en-AU" sz="1100" dirty="0" smtClean="0"/>
+                <a:t>v</a:t>
+              </a:r>
+              <a:endParaRPr lang="en-AU" sz="1200" dirty="0"/>
+            </a:p>
+          </p:txBody>
+        </p:sp>
+        <p:sp>
+          <p:nvSpPr>
+            <p:cNvPr id="70" name="TextBox 69"/>
+            <p:cNvSpPr txBox="1"/>
+            <p:nvPr/>
+          </p:nvSpPr>
+          <p:spPr>
+            <a:xfrm>
+              <a:off x="626837" y="8970781"/>
+              <a:ext cx="277811" cy="261610"/>
+            </a:xfrm>
+            <a:prstGeom prst="rect">
+              <a:avLst/>
+            </a:prstGeom>
+            <a:noFill/>
+          </p:spPr>
+          <p:txBody>
+            <a:bodyPr wrap="square" rtlCol="0">
+              <a:spAutoFit/>
+            </a:bodyPr>
+            <a:lstStyle/>
+            <a:p>
+              <a:r>
+                <a:rPr lang="en-AU" sz="1100" dirty="0" smtClean="0"/>
+                <a:t>ii</a:t>
+              </a:r>
+              <a:endParaRPr lang="en-AU" sz="1200" dirty="0"/>
+            </a:p>
+          </p:txBody>
+        </p:sp>
+        <p:sp>
+          <p:nvSpPr>
+            <p:cNvPr id="71" name="TextBox 70"/>
+            <p:cNvSpPr txBox="1"/>
+            <p:nvPr/>
+          </p:nvSpPr>
+          <p:spPr>
+            <a:xfrm>
+              <a:off x="2398753" y="8948212"/>
+              <a:ext cx="325521" cy="261610"/>
+            </a:xfrm>
+            <a:prstGeom prst="rect">
+              <a:avLst/>
+            </a:prstGeom>
+            <a:noFill/>
+          </p:spPr>
+          <p:txBody>
+            <a:bodyPr wrap="square" rtlCol="0">
+              <a:spAutoFit/>
+            </a:bodyPr>
+            <a:lstStyle/>
+            <a:p>
+              <a:r>
+                <a:rPr lang="en-AU" sz="1100" dirty="0" smtClean="0"/>
+                <a:t>iv</a:t>
+              </a:r>
+              <a:endParaRPr lang="en-AU" sz="1200" dirty="0"/>
+            </a:p>
+          </p:txBody>
+        </p:sp>
+        <p:sp>
+          <p:nvSpPr>
+            <p:cNvPr id="72" name="TextBox 71"/>
+            <p:cNvSpPr txBox="1"/>
+            <p:nvPr/>
+          </p:nvSpPr>
+          <p:spPr>
+            <a:xfrm>
+              <a:off x="4171905" y="8916980"/>
+              <a:ext cx="300810" cy="261610"/>
+            </a:xfrm>
+            <a:prstGeom prst="rect">
+              <a:avLst/>
+            </a:prstGeom>
+            <a:noFill/>
+          </p:spPr>
+          <p:txBody>
+            <a:bodyPr wrap="square" rtlCol="0">
+              <a:spAutoFit/>
+            </a:bodyPr>
+            <a:lstStyle/>
+            <a:p>
+              <a:r>
+                <a:rPr lang="en-AU" sz="1100" dirty="0" smtClean="0"/>
+                <a:t>vi</a:t>
+              </a:r>
+              <a:endParaRPr lang="en-AU" sz="1200" dirty="0"/>
+            </a:p>
+          </p:txBody>
+        </p:sp>
+        <p:sp>
+          <p:nvSpPr>
+            <p:cNvPr id="39" name="TextBox 38">
+              <a:extLst>
+                <a:ext uri="{FF2B5EF4-FFF2-40B4-BE49-F238E27FC236}">
+                  <a16:creationId xmlns:a16="http://schemas.microsoft.com/office/drawing/2014/main" xmlns="" id="{036694F8-822A-4EA9-A83F-BB11CF14A3AC}"/>
+                </a:ext>
+              </a:extLst>
+            </p:cNvPr>
+            <p:cNvSpPr txBox="1"/>
+            <p:nvPr/>
+          </p:nvSpPr>
+          <p:spPr>
+            <a:xfrm>
+              <a:off x="557412" y="7049499"/>
+              <a:ext cx="205508" cy="276999"/>
+            </a:xfrm>
+            <a:prstGeom prst="rect">
+              <a:avLst/>
+            </a:prstGeom>
+            <a:noFill/>
+          </p:spPr>
+          <p:txBody>
+            <a:bodyPr wrap="square" rtlCol="0">
+              <a:spAutoFit/>
+            </a:bodyPr>
+            <a:lstStyle/>
+            <a:p>
+              <a:r>
+                <a:rPr lang="en-AU" sz="1200" dirty="0" smtClean="0"/>
+                <a:t>b</a:t>
+              </a:r>
+              <a:endParaRPr lang="en-AU" sz="1200" dirty="0"/>
+            </a:p>
+          </p:txBody>
+        </p:sp>
+      </p:grpSp>
+      <p:sp>
+        <p:nvSpPr>
+          <p:cNvPr id="48" name="TextBox 47"/>
+          <p:cNvSpPr txBox="1"/>
+          <p:nvPr/>
+        </p:nvSpPr>
+        <p:spPr>
+          <a:xfrm>
+            <a:off x="-4628060" y="1093352"/>
+            <a:ext cx="4076700" cy="15604272"/>
+          </a:xfrm>
+          <a:prstGeom prst="rect">
+            <a:avLst/>
+          </a:prstGeom>
+          <a:noFill/>
+        </p:spPr>
+        <p:txBody>
+          <a:bodyPr wrap="square" rtlCol="0">
+            <a:spAutoFit/>
+          </a:bodyPr>
+          <a:lstStyle/>
+          <a:p>
+            <a:r>
+              <a:rPr lang="en-AU" dirty="0" smtClean="0"/>
+              <a:t>Total protein amounts are strongly driven by temp and to a lesser extent rainfall. Individual protein groups are all correlated positively with total protein to varying extent, implicating: 1.) a general thermodynamic requirement for greater amounts per leaf area of all major protein functional classes at lower temperatures, and 2.) a substitution of water use efficiency for N-use efficiency at low </a:t>
+            </a:r>
+            <a:r>
+              <a:rPr lang="en-AU" dirty="0" err="1" smtClean="0"/>
+              <a:t>rainfall.s</a:t>
+            </a:r>
+            <a:endParaRPr lang="en-AU" dirty="0" smtClean="0"/>
+          </a:p>
+          <a:p>
+            <a:endParaRPr lang="en-AU" dirty="0"/>
+          </a:p>
+          <a:p>
+            <a:r>
+              <a:rPr lang="en-AU" dirty="0"/>
+              <a:t>Per leaf area trends in CC’s are essentially identical to environmental trends in leaf protein abundance (</a:t>
+            </a:r>
+            <a:r>
+              <a:rPr lang="en-AU" dirty="0" err="1"/>
+              <a:t>cor</a:t>
+            </a:r>
+            <a:r>
+              <a:rPr lang="en-AU" dirty="0"/>
+              <a:t> </a:t>
+            </a:r>
+            <a:r>
+              <a:rPr lang="en-AU" dirty="0" smtClean="0"/>
+              <a:t>= 0.97). No strong effect of environment on proportional allocation of CC’s (although some response to irradiance). Some evidence that carboxylation capacity per leaf area is increased by increasing LMA, although there </a:t>
+            </a:r>
+            <a:r>
+              <a:rPr lang="en-AU" dirty="0"/>
+              <a:t>is substantial variation in the total protein – LMA relationship, indicating that LMA is responding to other requirements than photosynthetic </a:t>
+            </a:r>
+            <a:r>
+              <a:rPr lang="en-AU" dirty="0" smtClean="0"/>
+              <a:t>capacity (see last para).  </a:t>
+            </a:r>
+          </a:p>
+          <a:p>
+            <a:endParaRPr lang="en-AU" dirty="0"/>
+          </a:p>
+          <a:p>
+            <a:r>
+              <a:rPr lang="en-AU" dirty="0" smtClean="0"/>
+              <a:t>Patterns </a:t>
+            </a:r>
+            <a:r>
+              <a:rPr lang="en-AU" dirty="0"/>
+              <a:t>in per leaf area PS are also similar to patterns in total protein, although more variability is apparent in protein allocation to light harvesting capacity (</a:t>
+            </a:r>
+            <a:r>
+              <a:rPr lang="en-AU" dirty="0" err="1"/>
+              <a:t>cor</a:t>
+            </a:r>
+            <a:r>
+              <a:rPr lang="en-AU" dirty="0"/>
+              <a:t> = 0.82). Strong reduction in proportional allocation of protein to photosystems with increasing irradiance, and decreasing </a:t>
+            </a:r>
+            <a:r>
+              <a:rPr lang="en-AU" dirty="0" err="1"/>
+              <a:t>precip</a:t>
+            </a:r>
+            <a:r>
+              <a:rPr lang="en-AU" dirty="0"/>
+              <a:t>. Photosystem abundance does not increase on a per leaf area basis as leaves become thicker/denser, and reduces as a proportion of total leaf protein</a:t>
+            </a:r>
+            <a:r>
+              <a:rPr lang="en-AU" dirty="0" smtClean="0"/>
+              <a:t>.</a:t>
+            </a:r>
+            <a:r>
+              <a:rPr lang="en-AU" dirty="0"/>
+              <a:t/>
+            </a:r>
+            <a:br>
+              <a:rPr lang="en-AU" dirty="0"/>
+            </a:br>
+            <a:endParaRPr lang="en-AU" dirty="0"/>
+          </a:p>
+          <a:p>
+            <a:r>
+              <a:rPr lang="en-AU" dirty="0" smtClean="0"/>
+              <a:t>The role of LMA vs protein concentration (i.e. as a fraction of leaf dry mass) in determining per leaf area protein abundance depends interactively on MAP and MAT. Low per leaf area protein abundance at warm, wet sites is more closely associated with low LMA than low protein concentration, while high per leaf area protein abundance at cool, dry sites is strongly associated with high protein concentration. (This isn’t anything that couldn’t have been done using LMA, leaf N% and leaf </a:t>
+            </a:r>
+            <a:r>
+              <a:rPr lang="en-AU" dirty="0" err="1" smtClean="0"/>
+              <a:t>N_area</a:t>
+            </a:r>
+            <a:r>
+              <a:rPr lang="en-AU" dirty="0" smtClean="0"/>
+              <a:t>, but the point to make is that it’s not all just about increasing carboxylation capacity by adding layers of mesophyll).</a:t>
+            </a:r>
+          </a:p>
+        </p:txBody>
+      </p:sp>
+      <p:pic>
+        <p:nvPicPr>
+          <p:cNvPr id="4" name="Picture 3"/>
+          <p:cNvPicPr>
+            <a:picLocks noChangeAspect="1"/>
+          </p:cNvPicPr>
+          <p:nvPr/>
+        </p:nvPicPr>
+        <p:blipFill>
+          <a:blip r:embed="rId9" cstate="print">
+            <a:extLst>
+              <a:ext uri="{28A0092B-C50C-407E-A947-70E740481C1C}">
+                <a14:useLocalDpi xmlns:a14="http://schemas.microsoft.com/office/drawing/2010/main" val="0"/>
+              </a:ext>
+            </a:extLst>
+          </a:blip>
+          <a:stretch>
+            <a:fillRect/>
+          </a:stretch>
+        </p:blipFill>
+        <p:spPr>
+          <a:xfrm>
+            <a:off x="7319205" y="2749862"/>
+            <a:ext cx="1644680" cy="1391848"/>
+          </a:xfrm>
+          <a:prstGeom prst="rect">
+            <a:avLst/>
+          </a:prstGeom>
+        </p:spPr>
+      </p:pic>
+      <p:pic>
+        <p:nvPicPr>
+          <p:cNvPr id="5" name="Picture 4"/>
+          <p:cNvPicPr>
+            <a:picLocks noChangeAspect="1"/>
+          </p:cNvPicPr>
+          <p:nvPr/>
+        </p:nvPicPr>
+        <p:blipFill>
+          <a:blip r:embed="rId10" cstate="print">
+            <a:extLst>
+              <a:ext uri="{28A0092B-C50C-407E-A947-70E740481C1C}">
+                <a14:useLocalDpi xmlns:a14="http://schemas.microsoft.com/office/drawing/2010/main" val="0"/>
+              </a:ext>
+            </a:extLst>
+          </a:blip>
+          <a:stretch>
+            <a:fillRect/>
+          </a:stretch>
+        </p:blipFill>
+        <p:spPr>
+          <a:xfrm>
+            <a:off x="7386385" y="4322920"/>
+            <a:ext cx="1644680" cy="1391848"/>
+          </a:xfrm>
+          <a:prstGeom prst="rect">
+            <a:avLst/>
+          </a:prstGeom>
+        </p:spPr>
+      </p:pic>
+      <p:pic>
+        <p:nvPicPr>
+          <p:cNvPr id="57" name="Picture 56"/>
+          <p:cNvPicPr>
+            <a:picLocks noChangeAspect="1"/>
+          </p:cNvPicPr>
+          <p:nvPr/>
+        </p:nvPicPr>
+        <p:blipFill>
+          <a:blip r:embed="rId11" cstate="print">
+            <a:extLst>
+              <a:ext uri="{28A0092B-C50C-407E-A947-70E740481C1C}">
+                <a14:useLocalDpi xmlns:a14="http://schemas.microsoft.com/office/drawing/2010/main" val="0"/>
+              </a:ext>
+            </a:extLst>
+          </a:blip>
+          <a:stretch>
+            <a:fillRect/>
+          </a:stretch>
+        </p:blipFill>
+        <p:spPr>
+          <a:xfrm>
+            <a:off x="5692775" y="2601835"/>
+            <a:ext cx="1697164" cy="1501981"/>
+          </a:xfrm>
+          <a:prstGeom prst="rect">
+            <a:avLst/>
+          </a:prstGeom>
+        </p:spPr>
+      </p:pic>
+      <p:pic>
+        <p:nvPicPr>
+          <p:cNvPr id="58" name="Picture 57"/>
+          <p:cNvPicPr>
+            <a:picLocks noChangeAspect="1"/>
+          </p:cNvPicPr>
+          <p:nvPr/>
+        </p:nvPicPr>
+        <p:blipFill>
+          <a:blip r:embed="rId12" cstate="print">
+            <a:extLst>
+              <a:ext uri="{28A0092B-C50C-407E-A947-70E740481C1C}">
+                <a14:useLocalDpi xmlns:a14="http://schemas.microsoft.com/office/drawing/2010/main" val="0"/>
+              </a:ext>
+            </a:extLst>
+          </a:blip>
+          <a:stretch>
+            <a:fillRect/>
+          </a:stretch>
+        </p:blipFill>
+        <p:spPr>
+          <a:xfrm>
+            <a:off x="5689221" y="4239848"/>
+            <a:ext cx="1697164" cy="1501981"/>
+          </a:xfrm>
+          <a:prstGeom prst="rect">
+            <a:avLst/>
+          </a:prstGeom>
+        </p:spPr>
+      </p:pic>
+      <p:sp>
+        <p:nvSpPr>
+          <p:cNvPr id="73" name="TextBox 72"/>
+          <p:cNvSpPr txBox="1"/>
+          <p:nvPr/>
+        </p:nvSpPr>
+        <p:spPr>
+          <a:xfrm>
+            <a:off x="5871531" y="2564015"/>
+            <a:ext cx="133475" cy="261610"/>
+          </a:xfrm>
+          <a:prstGeom prst="rect">
+            <a:avLst/>
+          </a:prstGeom>
+          <a:noFill/>
+        </p:spPr>
+        <p:txBody>
+          <a:bodyPr wrap="square" rtlCol="0">
+            <a:spAutoFit/>
+          </a:bodyPr>
+          <a:lstStyle/>
+          <a:p>
+            <a:r>
+              <a:rPr lang="en-AU" sz="1100" dirty="0" err="1"/>
+              <a:t>i</a:t>
+            </a:r>
+            <a:endParaRPr lang="en-AU" sz="1200" dirty="0"/>
+          </a:p>
+        </p:txBody>
+      </p:sp>
+      <p:sp>
+        <p:nvSpPr>
+          <p:cNvPr id="74" name="TextBox 73"/>
+          <p:cNvSpPr txBox="1"/>
+          <p:nvPr/>
+        </p:nvSpPr>
+        <p:spPr>
+          <a:xfrm>
+            <a:off x="7526418" y="2708863"/>
+            <a:ext cx="368289" cy="261610"/>
+          </a:xfrm>
+          <a:prstGeom prst="rect">
+            <a:avLst/>
+          </a:prstGeom>
+          <a:noFill/>
+        </p:spPr>
+        <p:txBody>
+          <a:bodyPr wrap="square" rtlCol="0">
+            <a:spAutoFit/>
+          </a:bodyPr>
+          <a:lstStyle/>
+          <a:p>
+            <a:r>
+              <a:rPr lang="en-AU" sz="1100" dirty="0" smtClean="0"/>
+              <a:t>iii</a:t>
+            </a:r>
+            <a:endParaRPr lang="en-AU" sz="1200" dirty="0"/>
+          </a:p>
+        </p:txBody>
+      </p:sp>
+      <p:sp>
+        <p:nvSpPr>
+          <p:cNvPr id="75" name="TextBox 74"/>
+          <p:cNvSpPr txBox="1"/>
+          <p:nvPr/>
+        </p:nvSpPr>
+        <p:spPr>
+          <a:xfrm>
+            <a:off x="5871531" y="4116792"/>
+            <a:ext cx="322748" cy="261610"/>
+          </a:xfrm>
+          <a:prstGeom prst="rect">
+            <a:avLst/>
+          </a:prstGeom>
+          <a:noFill/>
+        </p:spPr>
+        <p:txBody>
+          <a:bodyPr wrap="square" rtlCol="0">
+            <a:spAutoFit/>
+          </a:bodyPr>
+          <a:lstStyle/>
+          <a:p>
+            <a:r>
+              <a:rPr lang="en-AU" sz="1100" dirty="0" smtClean="0"/>
+              <a:t>ii</a:t>
+            </a:r>
+            <a:endParaRPr lang="en-AU" sz="1200" dirty="0"/>
+          </a:p>
+        </p:txBody>
+      </p:sp>
+      <p:sp>
+        <p:nvSpPr>
+          <p:cNvPr id="76" name="TextBox 75"/>
+          <p:cNvSpPr txBox="1"/>
+          <p:nvPr/>
+        </p:nvSpPr>
+        <p:spPr>
+          <a:xfrm>
+            <a:off x="7526418" y="4105930"/>
+            <a:ext cx="293444" cy="261610"/>
+          </a:xfrm>
+          <a:prstGeom prst="rect">
+            <a:avLst/>
+          </a:prstGeom>
+          <a:noFill/>
+        </p:spPr>
+        <p:txBody>
+          <a:bodyPr wrap="square" rtlCol="0">
+            <a:spAutoFit/>
+          </a:bodyPr>
+          <a:lstStyle/>
+          <a:p>
+            <a:r>
+              <a:rPr lang="en-AU" sz="1100" dirty="0" smtClean="0"/>
+              <a:t>iv</a:t>
+            </a:r>
+            <a:endParaRPr lang="en-AU" sz="1200" dirty="0"/>
+          </a:p>
+        </p:txBody>
+      </p:sp>
+      <p:sp>
+        <p:nvSpPr>
+          <p:cNvPr id="44" name="TextBox 43">
+            <a:extLst>
+              <a:ext uri="{FF2B5EF4-FFF2-40B4-BE49-F238E27FC236}">
+                <a16:creationId xmlns:a16="http://schemas.microsoft.com/office/drawing/2014/main" xmlns="" id="{036694F8-822A-4EA9-A83F-BB11CF14A3AC}"/>
+              </a:ext>
+            </a:extLst>
+          </p:cNvPr>
+          <p:cNvSpPr txBox="1"/>
+          <p:nvPr/>
+        </p:nvSpPr>
+        <p:spPr>
+          <a:xfrm>
+            <a:off x="5898766" y="2367416"/>
+            <a:ext cx="205508" cy="276999"/>
+          </a:xfrm>
+          <a:prstGeom prst="rect">
+            <a:avLst/>
+          </a:prstGeom>
+          <a:noFill/>
+        </p:spPr>
+        <p:txBody>
+          <a:bodyPr wrap="square" rtlCol="0">
+            <a:spAutoFit/>
+          </a:bodyPr>
+          <a:lstStyle/>
+          <a:p>
+            <a:r>
+              <a:rPr lang="en-AU" sz="1200" dirty="0" smtClean="0"/>
+              <a:t>c</a:t>
+            </a:r>
+            <a:endParaRPr lang="en-AU" sz="1200" dirty="0"/>
+          </a:p>
+        </p:txBody>
+      </p:sp>
+      <p:grpSp>
+        <p:nvGrpSpPr>
+          <p:cNvPr id="15" name="Group 14"/>
+          <p:cNvGrpSpPr/>
+          <p:nvPr/>
+        </p:nvGrpSpPr>
+        <p:grpSpPr>
+          <a:xfrm>
+            <a:off x="12186698" y="6561310"/>
+            <a:ext cx="2162972" cy="4668355"/>
+            <a:chOff x="5401041" y="6615028"/>
+            <a:chExt cx="2162972" cy="4668355"/>
+          </a:xfrm>
+        </p:grpSpPr>
+        <p:sp>
+          <p:nvSpPr>
+            <p:cNvPr id="38" name="TextBox 37">
+              <a:extLst>
+                <a:ext uri="{FF2B5EF4-FFF2-40B4-BE49-F238E27FC236}">
+                  <a16:creationId xmlns:a16="http://schemas.microsoft.com/office/drawing/2014/main" xmlns="" id="{036694F8-822A-4EA9-A83F-BB11CF14A3AC}"/>
+                </a:ext>
+              </a:extLst>
+            </p:cNvPr>
+            <p:cNvSpPr txBox="1"/>
+            <p:nvPr/>
+          </p:nvSpPr>
+          <p:spPr>
+            <a:xfrm>
+              <a:off x="5401041" y="6615028"/>
+              <a:ext cx="205508" cy="276999"/>
+            </a:xfrm>
+            <a:prstGeom prst="rect">
+              <a:avLst/>
+            </a:prstGeom>
+            <a:noFill/>
+          </p:spPr>
+          <p:txBody>
+            <a:bodyPr wrap="square" rtlCol="0">
+              <a:spAutoFit/>
+            </a:bodyPr>
+            <a:lstStyle/>
+            <a:p>
+              <a:r>
+                <a:rPr lang="en-AU" sz="1200" dirty="0" smtClean="0"/>
+                <a:t>d</a:t>
+              </a:r>
+              <a:endParaRPr lang="en-AU" sz="1200" dirty="0"/>
+            </a:p>
+          </p:txBody>
+        </p:sp>
+        <p:grpSp>
+          <p:nvGrpSpPr>
+            <p:cNvPr id="14" name="Group 13"/>
+            <p:cNvGrpSpPr/>
+            <p:nvPr/>
+          </p:nvGrpSpPr>
+          <p:grpSpPr>
+            <a:xfrm>
+              <a:off x="5535363" y="6753528"/>
+              <a:ext cx="2028650" cy="4529855"/>
+              <a:chOff x="5535363" y="6753528"/>
+              <a:chExt cx="2028650" cy="4529855"/>
+            </a:xfrm>
+          </p:grpSpPr>
+          <p:grpSp>
+            <p:nvGrpSpPr>
+              <p:cNvPr id="3" name="Group 2"/>
+              <p:cNvGrpSpPr/>
+              <p:nvPr/>
+            </p:nvGrpSpPr>
+            <p:grpSpPr>
+              <a:xfrm>
+                <a:off x="5649404" y="6753528"/>
+                <a:ext cx="1914609" cy="4529855"/>
+                <a:chOff x="6928996" y="1387111"/>
+                <a:chExt cx="1914609" cy="4529855"/>
+              </a:xfrm>
+            </p:grpSpPr>
+            <p:pic>
+              <p:nvPicPr>
+                <p:cNvPr id="82" name="Picture 81">
+                  <a:extLst>
+                    <a:ext uri="{FF2B5EF4-FFF2-40B4-BE49-F238E27FC236}">
+                      <a16:creationId xmlns:a16="http://schemas.microsoft.com/office/drawing/2014/main" xmlns="" id="{4DEA67FD-D5A0-4C43-AE8C-3FD531A15958}"/>
+                    </a:ext>
+                  </a:extLst>
+                </p:cNvPr>
+                <p:cNvPicPr>
+                  <a:picLocks noChangeAspect="1"/>
+                </p:cNvPicPr>
+                <p:nvPr/>
+              </p:nvPicPr>
+              <p:blipFill>
+                <a:blip r:embed="rId13"/>
+                <a:stretch>
+                  <a:fillRect/>
+                </a:stretch>
+              </p:blipFill>
+              <p:spPr>
+                <a:xfrm>
+                  <a:off x="6966904" y="1387111"/>
+                  <a:ext cx="1864992" cy="1521184"/>
+                </a:xfrm>
+                <a:prstGeom prst="rect">
+                  <a:avLst/>
+                </a:prstGeom>
+              </p:spPr>
+            </p:pic>
+            <p:pic>
+              <p:nvPicPr>
+                <p:cNvPr id="84" name="Picture 83"/>
+                <p:cNvPicPr>
+                  <a:picLocks noChangeAspect="1"/>
+                </p:cNvPicPr>
+                <p:nvPr/>
+              </p:nvPicPr>
+              <p:blipFill>
+                <a:blip r:embed="rId14"/>
+                <a:stretch>
+                  <a:fillRect/>
+                </a:stretch>
+              </p:blipFill>
+              <p:spPr>
+                <a:xfrm>
+                  <a:off x="6928996" y="4393942"/>
+                  <a:ext cx="1914609" cy="1523024"/>
+                </a:xfrm>
+                <a:prstGeom prst="rect">
+                  <a:avLst/>
+                </a:prstGeom>
+              </p:spPr>
+            </p:pic>
+            <p:pic>
+              <p:nvPicPr>
+                <p:cNvPr id="2" name="Picture 1"/>
+                <p:cNvPicPr>
+                  <a:picLocks noChangeAspect="1"/>
+                </p:cNvPicPr>
+                <p:nvPr/>
+              </p:nvPicPr>
+              <p:blipFill>
+                <a:blip r:embed="rId15"/>
+                <a:stretch>
+                  <a:fillRect/>
+                </a:stretch>
+              </p:blipFill>
+              <p:spPr>
+                <a:xfrm>
+                  <a:off x="6975642" y="2908294"/>
+                  <a:ext cx="1843005" cy="1459628"/>
+                </a:xfrm>
+                <a:prstGeom prst="rect">
+                  <a:avLst/>
+                </a:prstGeom>
+              </p:spPr>
+            </p:pic>
+          </p:grpSp>
+          <p:sp>
+            <p:nvSpPr>
+              <p:cNvPr id="45" name="TextBox 44"/>
+              <p:cNvSpPr txBox="1"/>
+              <p:nvPr/>
+            </p:nvSpPr>
+            <p:spPr>
+              <a:xfrm>
+                <a:off x="5606549" y="6815084"/>
+                <a:ext cx="133475" cy="261610"/>
+              </a:xfrm>
+              <a:prstGeom prst="rect">
+                <a:avLst/>
+              </a:prstGeom>
+              <a:noFill/>
+            </p:spPr>
+            <p:txBody>
+              <a:bodyPr wrap="square" rtlCol="0">
+                <a:spAutoFit/>
+              </a:bodyPr>
+              <a:lstStyle/>
+              <a:p>
+                <a:r>
+                  <a:rPr lang="en-AU" sz="1100" dirty="0" err="1"/>
+                  <a:t>i</a:t>
+                </a:r>
+                <a:endParaRPr lang="en-AU" sz="1200" dirty="0"/>
+              </a:p>
+            </p:txBody>
+          </p:sp>
+          <p:sp>
+            <p:nvSpPr>
+              <p:cNvPr id="46" name="TextBox 45"/>
+              <p:cNvSpPr txBox="1"/>
+              <p:nvPr/>
+            </p:nvSpPr>
+            <p:spPr>
+              <a:xfrm>
+                <a:off x="5589068" y="8274710"/>
+                <a:ext cx="309698" cy="261610"/>
+              </a:xfrm>
+              <a:prstGeom prst="rect">
+                <a:avLst/>
+              </a:prstGeom>
+              <a:noFill/>
+            </p:spPr>
+            <p:txBody>
+              <a:bodyPr wrap="square" rtlCol="0">
+                <a:spAutoFit/>
+              </a:bodyPr>
+              <a:lstStyle/>
+              <a:p>
+                <a:r>
+                  <a:rPr lang="en-AU" sz="1100" dirty="0" smtClean="0"/>
+                  <a:t>ii</a:t>
+                </a:r>
+                <a:endParaRPr lang="en-AU" sz="1200" dirty="0"/>
+              </a:p>
+            </p:txBody>
+          </p:sp>
+          <p:sp>
+            <p:nvSpPr>
+              <p:cNvPr id="47" name="TextBox 46"/>
+              <p:cNvSpPr txBox="1"/>
+              <p:nvPr/>
+            </p:nvSpPr>
+            <p:spPr>
+              <a:xfrm>
+                <a:off x="5535363" y="9760357"/>
+                <a:ext cx="469643" cy="261610"/>
+              </a:xfrm>
+              <a:prstGeom prst="rect">
+                <a:avLst/>
+              </a:prstGeom>
+              <a:noFill/>
+            </p:spPr>
+            <p:txBody>
+              <a:bodyPr wrap="square" rtlCol="0">
+                <a:spAutoFit/>
+              </a:bodyPr>
+              <a:lstStyle/>
+              <a:p>
+                <a:r>
+                  <a:rPr lang="en-AU" sz="1100" dirty="0" smtClean="0"/>
+                  <a:t>iii</a:t>
+                </a:r>
+                <a:endParaRPr lang="en-AU" sz="1200" dirty="0"/>
+              </a:p>
+            </p:txBody>
+          </p:sp>
+        </p:grpSp>
+      </p:grpSp>
+      <p:pic>
+        <p:nvPicPr>
+          <p:cNvPr id="7" name="Picture 6"/>
+          <p:cNvPicPr>
+            <a:picLocks noChangeAspect="1"/>
+          </p:cNvPicPr>
+          <p:nvPr/>
+        </p:nvPicPr>
+        <p:blipFill>
+          <a:blip r:embed="rId16">
+            <a:extLst>
+              <a:ext uri="{28A0092B-C50C-407E-A947-70E740481C1C}">
+                <a14:useLocalDpi xmlns:a14="http://schemas.microsoft.com/office/drawing/2010/main" val="0"/>
+              </a:ext>
+            </a:extLst>
+          </a:blip>
+          <a:stretch>
+            <a:fillRect/>
+          </a:stretch>
+        </p:blipFill>
+        <p:spPr>
+          <a:xfrm>
+            <a:off x="-455664" y="1825298"/>
+            <a:ext cx="5661126" cy="5072555"/>
+          </a:xfrm>
+          <a:prstGeom prst="rect">
+            <a:avLst/>
+          </a:prstGeom>
+        </p:spPr>
+      </p:pic>
+      <p:grpSp>
+        <p:nvGrpSpPr>
+          <p:cNvPr id="16" name="Group 15"/>
+          <p:cNvGrpSpPr/>
+          <p:nvPr/>
+        </p:nvGrpSpPr>
+        <p:grpSpPr>
+          <a:xfrm>
+            <a:off x="6646337" y="6689340"/>
+            <a:ext cx="2033633" cy="5331210"/>
+            <a:chOff x="6646337" y="6689340"/>
+            <a:chExt cx="2033633" cy="5331210"/>
+          </a:xfrm>
+        </p:grpSpPr>
+        <p:pic>
+          <p:nvPicPr>
+            <p:cNvPr id="8" name="Picture 7"/>
+            <p:cNvPicPr>
+              <a:picLocks noChangeAspect="1"/>
+            </p:cNvPicPr>
+            <p:nvPr/>
+          </p:nvPicPr>
+          <p:blipFill>
+            <a:blip r:embed="rId17"/>
+            <a:stretch>
+              <a:fillRect/>
+            </a:stretch>
+          </p:blipFill>
+          <p:spPr>
+            <a:xfrm>
+              <a:off x="6664595" y="6689340"/>
+              <a:ext cx="2001335" cy="1793262"/>
+            </a:xfrm>
+            <a:prstGeom prst="rect">
+              <a:avLst/>
+            </a:prstGeom>
+          </p:spPr>
+        </p:pic>
+        <p:pic>
+          <p:nvPicPr>
+            <p:cNvPr id="11" name="Picture 10"/>
+            <p:cNvPicPr>
+              <a:picLocks noChangeAspect="1"/>
+            </p:cNvPicPr>
+            <p:nvPr/>
+          </p:nvPicPr>
+          <p:blipFill>
+            <a:blip r:embed="rId18"/>
+            <a:stretch>
+              <a:fillRect/>
+            </a:stretch>
+          </p:blipFill>
+          <p:spPr>
+            <a:xfrm>
+              <a:off x="6656747" y="8446005"/>
+              <a:ext cx="2023223" cy="1812874"/>
+            </a:xfrm>
+            <a:prstGeom prst="rect">
+              <a:avLst/>
+            </a:prstGeom>
+          </p:spPr>
+        </p:pic>
+        <p:pic>
+          <p:nvPicPr>
+            <p:cNvPr id="12" name="Picture 11"/>
+            <p:cNvPicPr>
+              <a:picLocks noChangeAspect="1"/>
+            </p:cNvPicPr>
+            <p:nvPr/>
+          </p:nvPicPr>
+          <p:blipFill>
+            <a:blip r:embed="rId19"/>
+            <a:stretch>
+              <a:fillRect/>
+            </a:stretch>
+          </p:blipFill>
+          <p:spPr>
+            <a:xfrm>
+              <a:off x="6646337" y="10213639"/>
+              <a:ext cx="2016568" cy="1806911"/>
+            </a:xfrm>
+            <a:prstGeom prst="rect">
+              <a:avLst/>
+            </a:prstGeom>
+          </p:spPr>
+        </p:pic>
+      </p:grpSp>
+      <p:sp>
+        <p:nvSpPr>
+          <p:cNvPr id="51" name="TextBox 50"/>
+          <p:cNvSpPr txBox="1"/>
+          <p:nvPr/>
+        </p:nvSpPr>
+        <p:spPr>
+          <a:xfrm>
+            <a:off x="6557476" y="6704248"/>
+            <a:ext cx="133475" cy="261610"/>
+          </a:xfrm>
+          <a:prstGeom prst="rect">
+            <a:avLst/>
+          </a:prstGeom>
+          <a:noFill/>
+        </p:spPr>
+        <p:txBody>
+          <a:bodyPr wrap="square" rtlCol="0">
+            <a:spAutoFit/>
+          </a:bodyPr>
+          <a:lstStyle/>
+          <a:p>
+            <a:r>
+              <a:rPr lang="en-AU" sz="1100" dirty="0" err="1"/>
+              <a:t>i</a:t>
+            </a:r>
+            <a:endParaRPr lang="en-AU" sz="1200" dirty="0"/>
+          </a:p>
+        </p:txBody>
+      </p:sp>
+      <p:sp>
+        <p:nvSpPr>
+          <p:cNvPr id="52" name="TextBox 51"/>
+          <p:cNvSpPr txBox="1"/>
+          <p:nvPr/>
+        </p:nvSpPr>
+        <p:spPr>
+          <a:xfrm>
+            <a:off x="6509746" y="8566090"/>
+            <a:ext cx="309698" cy="261610"/>
+          </a:xfrm>
+          <a:prstGeom prst="rect">
+            <a:avLst/>
+          </a:prstGeom>
+          <a:noFill/>
+        </p:spPr>
+        <p:txBody>
+          <a:bodyPr wrap="square" rtlCol="0">
+            <a:spAutoFit/>
+          </a:bodyPr>
+          <a:lstStyle/>
+          <a:p>
+            <a:r>
+              <a:rPr lang="en-AU" sz="1100" dirty="0" smtClean="0"/>
+              <a:t>ii</a:t>
+            </a:r>
+            <a:endParaRPr lang="en-AU" sz="1200" dirty="0"/>
+          </a:p>
+        </p:txBody>
+      </p:sp>
+      <p:sp>
+        <p:nvSpPr>
+          <p:cNvPr id="53" name="TextBox 52"/>
+          <p:cNvSpPr txBox="1"/>
+          <p:nvPr/>
+        </p:nvSpPr>
+        <p:spPr>
+          <a:xfrm>
+            <a:off x="6456129" y="10336723"/>
+            <a:ext cx="469643" cy="261610"/>
+          </a:xfrm>
+          <a:prstGeom prst="rect">
+            <a:avLst/>
+          </a:prstGeom>
+          <a:noFill/>
+        </p:spPr>
+        <p:txBody>
+          <a:bodyPr wrap="square" rtlCol="0">
+            <a:spAutoFit/>
+          </a:bodyPr>
+          <a:lstStyle/>
+          <a:p>
+            <a:r>
+              <a:rPr lang="en-AU" sz="1100" dirty="0" smtClean="0"/>
+              <a:t>iii</a:t>
+            </a:r>
+            <a:endParaRPr lang="en-AU" sz="1200" dirty="0"/>
+          </a:p>
+        </p:txBody>
+      </p:sp>
+      <p:sp>
+        <p:nvSpPr>
+          <p:cNvPr id="77" name="TextBox 76">
+            <a:extLst>
+              <a:ext uri="{FF2B5EF4-FFF2-40B4-BE49-F238E27FC236}">
+                <a16:creationId xmlns:a16="http://schemas.microsoft.com/office/drawing/2014/main" xmlns="" id="{036694F8-822A-4EA9-A83F-BB11CF14A3AC}"/>
+              </a:ext>
+            </a:extLst>
+          </p:cNvPr>
+          <p:cNvSpPr txBox="1"/>
+          <p:nvPr/>
+        </p:nvSpPr>
+        <p:spPr>
+          <a:xfrm>
+            <a:off x="808334" y="1642044"/>
+            <a:ext cx="172741" cy="276999"/>
+          </a:xfrm>
+          <a:prstGeom prst="rect">
+            <a:avLst/>
+          </a:prstGeom>
+          <a:noFill/>
+        </p:spPr>
+        <p:txBody>
+          <a:bodyPr wrap="square" rtlCol="0">
+            <a:spAutoFit/>
+          </a:bodyPr>
+          <a:lstStyle/>
+          <a:p>
+            <a:r>
+              <a:rPr lang="en-AU" sz="1200" dirty="0" smtClean="0"/>
+              <a:t>a</a:t>
+            </a:r>
+            <a:endParaRPr lang="en-AU" sz="1200" dirty="0"/>
+          </a:p>
+        </p:txBody>
+      </p:sp>
+      <p:sp>
+        <p:nvSpPr>
+          <p:cNvPr id="78" name="TextBox 77">
+            <a:extLst>
+              <a:ext uri="{FF2B5EF4-FFF2-40B4-BE49-F238E27FC236}">
+                <a16:creationId xmlns:a16="http://schemas.microsoft.com/office/drawing/2014/main" xmlns="" id="{036694F8-822A-4EA9-A83F-BB11CF14A3AC}"/>
+              </a:ext>
+            </a:extLst>
+          </p:cNvPr>
+          <p:cNvSpPr txBox="1"/>
+          <p:nvPr/>
+        </p:nvSpPr>
+        <p:spPr>
+          <a:xfrm>
+            <a:off x="6257135" y="6437173"/>
+            <a:ext cx="172741" cy="276999"/>
+          </a:xfrm>
+          <a:prstGeom prst="rect">
+            <a:avLst/>
+          </a:prstGeom>
+          <a:noFill/>
+        </p:spPr>
+        <p:txBody>
+          <a:bodyPr wrap="square" rtlCol="0">
+            <a:spAutoFit/>
+          </a:bodyPr>
+          <a:lstStyle/>
+          <a:p>
+            <a:r>
+              <a:rPr lang="en-AU" sz="1200" dirty="0" smtClean="0"/>
+              <a:t>d</a:t>
+            </a:r>
+            <a:endParaRPr lang="en-AU" sz="1200" dirty="0"/>
+          </a:p>
+        </p:txBody>
+      </p:sp>
+    </p:spTree>
+    <p:extLst>
+      <p:ext uri="{BB962C8B-B14F-4D97-AF65-F5344CB8AC3E}">
+        <p14:creationId xmlns:p14="http://schemas.microsoft.com/office/powerpoint/2010/main" val="1205351557"/>
+      </p:ext>
+    </p:extLst>
+  </p:cSld>
+  <p:clrMapOvr>
+    <a:masterClrMapping/>
+  </p:clrMapOvr>
+  <p:timing>
+    <p:tnLst>
+      <p:par>
+        <p:cTn id="1" dur="indefinite" restart="never" nodeType="tmRoot"/>
+      </p:par>
+    </p:tnLst>
+  </p:timing>
+</p:sld>
+</file>
+
+<file path=ppt/slides/slide4.xml><?xml version="1.0" encoding="utf-8"?>
+<p:sld xmlns:a="http://schemas.openxmlformats.org/drawingml/2006/main" xmlns:r="http://schemas.openxmlformats.org/officeDocument/2006/relationships" xmlns:p="http://schemas.openxmlformats.org/presentationml/2006/main">
+  <p:cSld>
+    <p:spTree>
+      <p:nvGrpSpPr>
+        <p:cNvPr id="1" name=""/>
+        <p:cNvGrpSpPr/>
+        <p:nvPr/>
+      </p:nvGrpSpPr>
+      <p:grpSpPr>
+        <a:xfrm>
+          <a:off x="0" y="0"/>
+          <a:ext cx="0" cy="0"/>
+          <a:chOff x="0" y="0"/>
+          <a:chExt cx="0" cy="0"/>
+        </a:xfrm>
+      </p:grpSpPr>
+      <p:grpSp>
+        <p:nvGrpSpPr>
           <p:cNvPr id="19" name="Group 18"/>
           <p:cNvGrpSpPr/>
           <p:nvPr/>
@@ -5765,7 +7552,7 @@
             <p:cNvPr id="20" name="TextBox 19">
               <a:extLst>
                 <a:ext uri="{FF2B5EF4-FFF2-40B4-BE49-F238E27FC236}">
-                  <a16:creationId xmlns="" xmlns:a16="http://schemas.microsoft.com/office/drawing/2014/main" id="{036694F8-822A-4EA9-A83F-BB11CF14A3AC}"/>
+                  <a16:creationId xmlns:a16="http://schemas.microsoft.com/office/drawing/2014/main" xmlns="" id="{036694F8-822A-4EA9-A83F-BB11CF14A3AC}"/>
                 </a:ext>
               </a:extLst>
             </p:cNvPr>
@@ -6174,7 +7961,7 @@
             <p:cNvPr id="39" name="TextBox 38">
               <a:extLst>
                 <a:ext uri="{FF2B5EF4-FFF2-40B4-BE49-F238E27FC236}">
-                  <a16:creationId xmlns="" xmlns:a16="http://schemas.microsoft.com/office/drawing/2014/main" id="{036694F8-822A-4EA9-A83F-BB11CF14A3AC}"/>
+                  <a16:creationId xmlns:a16="http://schemas.microsoft.com/office/drawing/2014/main" xmlns="" id="{036694F8-822A-4EA9-A83F-BB11CF14A3AC}"/>
                 </a:ext>
               </a:extLst>
             </p:cNvPr>
@@ -6629,7 +8416,7 @@
           <p:cNvPr id="44" name="TextBox 43">
             <a:extLst>
               <a:ext uri="{FF2B5EF4-FFF2-40B4-BE49-F238E27FC236}">
-                <a16:creationId xmlns="" xmlns:a16="http://schemas.microsoft.com/office/drawing/2014/main" id="{036694F8-822A-4EA9-A83F-BB11CF14A3AC}"/>
+                <a16:creationId xmlns:a16="http://schemas.microsoft.com/office/drawing/2014/main" xmlns="" id="{036694F8-822A-4EA9-A83F-BB11CF14A3AC}"/>
               </a:ext>
             </a:extLst>
           </p:cNvPr>
@@ -6709,7 +8496,7 @@
             <p:cNvPr id="38" name="TextBox 37">
               <a:extLst>
                 <a:ext uri="{FF2B5EF4-FFF2-40B4-BE49-F238E27FC236}">
-                  <a16:creationId xmlns="" xmlns:a16="http://schemas.microsoft.com/office/drawing/2014/main" id="{036694F8-822A-4EA9-A83F-BB11CF14A3AC}"/>
+                  <a16:creationId xmlns:a16="http://schemas.microsoft.com/office/drawing/2014/main" xmlns="" id="{036694F8-822A-4EA9-A83F-BB11CF14A3AC}"/>
                 </a:ext>
               </a:extLst>
             </p:cNvPr>
@@ -6773,7 +8560,7 @@
                 <p:cNvPr id="82" name="Picture 81">
                   <a:extLst>
                     <a:ext uri="{FF2B5EF4-FFF2-40B4-BE49-F238E27FC236}">
-                      <a16:creationId xmlns="" xmlns:a16="http://schemas.microsoft.com/office/drawing/2014/main" id="{4DEA67FD-D5A0-4C43-AE8C-3FD531A15958}"/>
+                      <a16:creationId xmlns:a16="http://schemas.microsoft.com/office/drawing/2014/main" xmlns="" id="{4DEA67FD-D5A0-4C43-AE8C-3FD531A15958}"/>
                     </a:ext>
                   </a:extLst>
                 </p:cNvPr>
@@ -6982,7 +8769,7 @@
             <p:cNvPr id="49" name="TextBox 48">
               <a:extLst>
                 <a:ext uri="{FF2B5EF4-FFF2-40B4-BE49-F238E27FC236}">
-                  <a16:creationId xmlns="" xmlns:a16="http://schemas.microsoft.com/office/drawing/2014/main" id="{036694F8-822A-4EA9-A83F-BB11CF14A3AC}"/>
+                  <a16:creationId xmlns:a16="http://schemas.microsoft.com/office/drawing/2014/main" xmlns="" id="{036694F8-822A-4EA9-A83F-BB11CF14A3AC}"/>
                 </a:ext>
               </a:extLst>
             </p:cNvPr>
@@ -7017,7 +8804,7 @@
     </p:spTree>
     <p:extLst>
       <p:ext uri="{BB962C8B-B14F-4D97-AF65-F5344CB8AC3E}">
-        <p14:creationId xmlns:p14="http://schemas.microsoft.com/office/powerpoint/2010/main" val="1205351557"/>
+        <p14:creationId xmlns:p14="http://schemas.microsoft.com/office/powerpoint/2010/main" val="3602167206"/>
       </p:ext>
     </p:extLst>
   </p:cSld>
@@ -7034,7 +8821,7 @@
 </p:sld>
 </file>
 
-<file path=ppt/slides/slide4.xml><?xml version="1.0" encoding="utf-8"?>
+<file path=ppt/slides/slide5.xml><?xml version="1.0" encoding="utf-8"?>
 <p:sld xmlns:a="http://schemas.openxmlformats.org/drawingml/2006/main" xmlns:r="http://schemas.openxmlformats.org/officeDocument/2006/relationships" xmlns:p="http://schemas.openxmlformats.org/presentationml/2006/main">
   <p:cSld>
     <p:spTree>
@@ -7100,7 +8887,7 @@
             <p:cNvPr id="20" name="TextBox 19">
               <a:extLst>
                 <a:ext uri="{FF2B5EF4-FFF2-40B4-BE49-F238E27FC236}">
-                  <a16:creationId xmlns="" xmlns:a16="http://schemas.microsoft.com/office/drawing/2014/main" id="{036694F8-822A-4EA9-A83F-BB11CF14A3AC}"/>
+                  <a16:creationId xmlns:a16="http://schemas.microsoft.com/office/drawing/2014/main" xmlns="" id="{036694F8-822A-4EA9-A83F-BB11CF14A3AC}"/>
                 </a:ext>
               </a:extLst>
             </p:cNvPr>
@@ -7509,7 +9296,7 @@
             <p:cNvPr id="39" name="TextBox 38">
               <a:extLst>
                 <a:ext uri="{FF2B5EF4-FFF2-40B4-BE49-F238E27FC236}">
-                  <a16:creationId xmlns="" xmlns:a16="http://schemas.microsoft.com/office/drawing/2014/main" id="{036694F8-822A-4EA9-A83F-BB11CF14A3AC}"/>
+                  <a16:creationId xmlns:a16="http://schemas.microsoft.com/office/drawing/2014/main" xmlns="" id="{036694F8-822A-4EA9-A83F-BB11CF14A3AC}"/>
                 </a:ext>
               </a:extLst>
             </p:cNvPr>
@@ -7738,7 +9525,7 @@
             <p:cNvPr id="82" name="Picture 81">
               <a:extLst>
                 <a:ext uri="{FF2B5EF4-FFF2-40B4-BE49-F238E27FC236}">
-                  <a16:creationId xmlns="" xmlns:a16="http://schemas.microsoft.com/office/drawing/2014/main" id="{4DEA67FD-D5A0-4C43-AE8C-3FD531A15958}"/>
+                  <a16:creationId xmlns:a16="http://schemas.microsoft.com/office/drawing/2014/main" xmlns="" id="{4DEA67FD-D5A0-4C43-AE8C-3FD531A15958}"/>
                 </a:ext>
               </a:extLst>
             </p:cNvPr>
@@ -8057,7 +9844,7 @@
           <p:cNvPr id="44" name="TextBox 43">
             <a:extLst>
               <a:ext uri="{FF2B5EF4-FFF2-40B4-BE49-F238E27FC236}">
-                <a16:creationId xmlns="" xmlns:a16="http://schemas.microsoft.com/office/drawing/2014/main" id="{036694F8-822A-4EA9-A83F-BB11CF14A3AC}"/>
+                <a16:creationId xmlns:a16="http://schemas.microsoft.com/office/drawing/2014/main" xmlns="" id="{036694F8-822A-4EA9-A83F-BB11CF14A3AC}"/>
               </a:ext>
             </a:extLst>
           </p:cNvPr>
@@ -8093,7 +9880,7 @@
           <p:cNvPr id="38" name="TextBox 37">
             <a:extLst>
               <a:ext uri="{FF2B5EF4-FFF2-40B4-BE49-F238E27FC236}">
-                <a16:creationId xmlns="" xmlns:a16="http://schemas.microsoft.com/office/drawing/2014/main" id="{036694F8-822A-4EA9-A83F-BB11CF14A3AC}"/>
+                <a16:creationId xmlns:a16="http://schemas.microsoft.com/office/drawing/2014/main" xmlns="" id="{036694F8-822A-4EA9-A83F-BB11CF14A3AC}"/>
               </a:ext>
             </a:extLst>
           </p:cNvPr>

</xml_diff>